<commit_message>
updated docs with meeting notes
</commit_message>
<xml_diff>
--- a/Capstone TA/How to Succeed in Capstone.pptx
+++ b/Capstone TA/How to Succeed in Capstone.pptx
@@ -8,7 +8,8 @@
     <p:sldId id="256" r:id="rId2"/>
     <p:sldId id="258" r:id="rId3"/>
     <p:sldId id="257" r:id="rId4"/>
-    <p:sldId id="259" r:id="rId5"/>
+    <p:sldId id="260" r:id="rId5"/>
+    <p:sldId id="259" r:id="rId6"/>
   </p:sldIdLst>
   <p:sldSz cx="12192000" cy="6858000"/>
   <p:notesSz cx="6858000" cy="9144000"/>
@@ -107,6 +108,11 @@
       </a:defRPr>
     </a:lvl9pPr>
   </p:defaultTextStyle>
+  <p:extLst>
+    <p:ext uri="{EFAFB233-063F-42B5-8137-9DF3F51BA10A}">
+      <p15:sldGuideLst xmlns:p15="http://schemas.microsoft.com/office/powerpoint/2012/main"/>
+    </p:ext>
+  </p:extLst>
 </p:presentation>
 </file>
 
@@ -241,7 +247,7 @@
           <a:p>
             <a:fld id="{4AAD347D-5ACD-4C99-B74B-A9C85AD731AF}" type="datetimeFigureOut">
               <a:rPr lang="en-US" smtClean="0"/>
-              <a:t>9/15/16</a:t>
+              <a:t>9/21/16</a:t>
             </a:fld>
             <a:endParaRPr lang="en-US" dirty="0"/>
           </a:p>
@@ -411,7 +417,7 @@
           <a:p>
             <a:fld id="{4509A250-FF31-4206-8172-F9D3106AACB1}" type="datetimeFigureOut">
               <a:rPr lang="en-US" smtClean="0"/>
-              <a:t>9/15/16</a:t>
+              <a:t>9/21/16</a:t>
             </a:fld>
             <a:endParaRPr lang="en-US" dirty="0"/>
           </a:p>
@@ -591,7 +597,7 @@
           <a:p>
             <a:fld id="{4509A250-FF31-4206-8172-F9D3106AACB1}" type="datetimeFigureOut">
               <a:rPr lang="en-US" smtClean="0"/>
-              <a:t>9/15/16</a:t>
+              <a:t>9/21/16</a:t>
             </a:fld>
             <a:endParaRPr lang="en-US" dirty="0"/>
           </a:p>
@@ -761,7 +767,7 @@
           <a:p>
             <a:fld id="{4509A250-FF31-4206-8172-F9D3106AACB1}" type="datetimeFigureOut">
               <a:rPr lang="en-US" smtClean="0"/>
-              <a:t>9/15/16</a:t>
+              <a:t>9/21/16</a:t>
             </a:fld>
             <a:endParaRPr lang="en-US" dirty="0"/>
           </a:p>
@@ -1007,7 +1013,7 @@
           <a:p>
             <a:fld id="{9796027F-7875-4030-9381-8BD8C4F21935}" type="datetimeFigureOut">
               <a:rPr lang="en-US" smtClean="0"/>
-              <a:t>9/15/16</a:t>
+              <a:t>9/21/16</a:t>
             </a:fld>
             <a:endParaRPr lang="en-US" dirty="0"/>
           </a:p>
@@ -1239,7 +1245,7 @@
           <a:p>
             <a:fld id="{9796027F-7875-4030-9381-8BD8C4F21935}" type="datetimeFigureOut">
               <a:rPr lang="en-US" smtClean="0"/>
-              <a:t>9/15/16</a:t>
+              <a:t>9/21/16</a:t>
             </a:fld>
             <a:endParaRPr lang="en-US" dirty="0"/>
           </a:p>
@@ -1606,7 +1612,7 @@
           <a:p>
             <a:fld id="{9796027F-7875-4030-9381-8BD8C4F21935}" type="datetimeFigureOut">
               <a:rPr lang="en-US" smtClean="0"/>
-              <a:t>9/15/16</a:t>
+              <a:t>9/21/16</a:t>
             </a:fld>
             <a:endParaRPr lang="en-US" dirty="0"/>
           </a:p>
@@ -1724,7 +1730,7 @@
           <a:p>
             <a:fld id="{4509A250-FF31-4206-8172-F9D3106AACB1}" type="datetimeFigureOut">
               <a:rPr lang="en-US" smtClean="0"/>
-              <a:t>9/15/16</a:t>
+              <a:t>9/21/16</a:t>
             </a:fld>
             <a:endParaRPr lang="en-US" dirty="0"/>
           </a:p>
@@ -1819,7 +1825,7 @@
           <a:p>
             <a:fld id="{4509A250-FF31-4206-8172-F9D3106AACB1}" type="datetimeFigureOut">
               <a:rPr lang="en-US" smtClean="0"/>
-              <a:t>9/15/16</a:t>
+              <a:t>9/21/16</a:t>
             </a:fld>
             <a:endParaRPr lang="en-US" dirty="0"/>
           </a:p>
@@ -2096,7 +2102,7 @@
           <a:p>
             <a:fld id="{4509A250-FF31-4206-8172-F9D3106AACB1}" type="datetimeFigureOut">
               <a:rPr lang="en-US" smtClean="0"/>
-              <a:t>9/15/16</a:t>
+              <a:t>9/21/16</a:t>
             </a:fld>
             <a:endParaRPr lang="en-US" dirty="0"/>
           </a:p>
@@ -2349,7 +2355,7 @@
           <a:p>
             <a:fld id="{4509A250-FF31-4206-8172-F9D3106AACB1}" type="datetimeFigureOut">
               <a:rPr lang="en-US" smtClean="0"/>
-              <a:t>9/15/16</a:t>
+              <a:t>9/21/16</a:t>
             </a:fld>
             <a:endParaRPr lang="en-US" dirty="0"/>
           </a:p>
@@ -2562,7 +2568,7 @@
           <a:p>
             <a:fld id="{4AAD347D-5ACD-4C99-B74B-A9C85AD731AF}" type="datetimeFigureOut">
               <a:rPr lang="en-US" smtClean="0"/>
-              <a:t>9/15/16</a:t>
+              <a:t>9/21/16</a:t>
             </a:fld>
             <a:endParaRPr lang="en-US" dirty="0"/>
           </a:p>
@@ -3273,6 +3279,116 @@
 </file>
 
 <file path=ppt/slides/slide4.xml><?xml version="1.0" encoding="utf-8"?>
+<p:sld xmlns:a="http://schemas.openxmlformats.org/drawingml/2006/main" xmlns:r="http://schemas.openxmlformats.org/officeDocument/2006/relationships" xmlns:p="http://schemas.openxmlformats.org/presentationml/2006/main">
+  <p:cSld>
+    <p:spTree>
+      <p:nvGrpSpPr>
+        <p:cNvPr id="1" name=""/>
+        <p:cNvGrpSpPr/>
+        <p:nvPr/>
+      </p:nvGrpSpPr>
+      <p:grpSpPr>
+        <a:xfrm>
+          <a:off x="0" y="0"/>
+          <a:ext cx="0" cy="0"/>
+          <a:chOff x="0" y="0"/>
+          <a:chExt cx="0" cy="0"/>
+        </a:xfrm>
+      </p:grpSpPr>
+      <p:sp>
+        <p:nvSpPr>
+          <p:cNvPr id="2" name="Title 1"/>
+          <p:cNvSpPr>
+            <a:spLocks noGrp="1"/>
+          </p:cNvSpPr>
+          <p:nvPr>
+            <p:ph type="title"/>
+          </p:nvPr>
+        </p:nvSpPr>
+        <p:spPr/>
+        <p:txBody>
+          <a:bodyPr/>
+          <a:lstStyle/>
+          <a:p>
+            <a:endParaRPr lang="en-US"/>
+          </a:p>
+        </p:txBody>
+      </p:sp>
+      <p:sp>
+        <p:nvSpPr>
+          <p:cNvPr id="3" name="Content Placeholder 2"/>
+          <p:cNvSpPr>
+            <a:spLocks noGrp="1"/>
+          </p:cNvSpPr>
+          <p:nvPr>
+            <p:ph idx="1"/>
+          </p:nvPr>
+        </p:nvSpPr>
+        <p:spPr/>
+        <p:txBody>
+          <a:bodyPr/>
+          <a:lstStyle/>
+          <a:p>
+            <a:r>
+              <a:rPr lang="en-US" dirty="0" smtClean="0"/>
+              <a:t>Constraints: time, resources and money</a:t>
+            </a:r>
+          </a:p>
+          <a:p>
+            <a:r>
+              <a:rPr lang="en-US" dirty="0" smtClean="0"/>
+              <a:t>Medical device development requires time and money </a:t>
+            </a:r>
+          </a:p>
+          <a:p>
+            <a:r>
+              <a:rPr lang="en-US" dirty="0" smtClean="0"/>
+              <a:t>Made a modification to an existing tool </a:t>
+            </a:r>
+          </a:p>
+          <a:p>
+            <a:r>
+              <a:rPr lang="en-US" dirty="0" smtClean="0"/>
+              <a:t>Did not reinvent the wheel</a:t>
+            </a:r>
+          </a:p>
+          <a:p>
+            <a:r>
+              <a:rPr lang="en-US" dirty="0" smtClean="0"/>
+              <a:t>Used connections/resources currently available at </a:t>
+            </a:r>
+            <a:r>
+              <a:rPr lang="en-US" dirty="0" err="1" smtClean="0"/>
+              <a:t>SickKids</a:t>
+            </a:r>
+            <a:r>
+              <a:rPr lang="en-US" dirty="0" smtClean="0"/>
+              <a:t> and U of T</a:t>
+            </a:r>
+          </a:p>
+          <a:p>
+            <a:r>
+              <a:rPr lang="en-US" smtClean="0"/>
+              <a:t>Asked for advice – TA, Prof and Vito Forte</a:t>
+            </a:r>
+            <a:endParaRPr lang="en-US" dirty="0"/>
+          </a:p>
+        </p:txBody>
+      </p:sp>
+    </p:spTree>
+    <p:extLst>
+      <p:ext uri="{BB962C8B-B14F-4D97-AF65-F5344CB8AC3E}">
+        <p14:creationId xmlns:p14="http://schemas.microsoft.com/office/powerpoint/2010/main" val="591556241"/>
+      </p:ext>
+    </p:extLst>
+  </p:cSld>
+  <p:clrMapOvr>
+    <a:masterClrMapping/>
+  </p:clrMapOvr>
+</p:sld>
+</file>
+
+<file path=ppt/slides/slide5.xml><?xml version="1.0" encoding="utf-8"?>
 <p:sld xmlns:a="http://schemas.openxmlformats.org/drawingml/2006/main" xmlns:r="http://schemas.openxmlformats.org/officeDocument/2006/relationships" xmlns:p="http://schemas.openxmlformats.org/presentationml/2006/main">
   <p:cSld>
     <p:spTree>

</xml_diff>